<commit_message>
corrections syntaxes, grammaires etc...
</commit_message>
<xml_diff>
--- a/STI19_projet1_presentation.pptx
+++ b/STI19_projet1_presentation.pptx
@@ -202,7 +202,7 @@
           <a:p>
             <a:fld id="{88C82391-6AEF-4848-845B-9D4462547DF0}" type="datetimeFigureOut">
               <a:rPr lang="fr-CH" smtClean="0"/>
-              <a:t>11.10.2019</a:t>
+              <a:t>12.10.2019</a:t>
             </a:fld>
             <a:endParaRPr lang="fr-CH"/>
           </a:p>
@@ -9035,7 +9035,7 @@
                                     </p:set>
                                     <p:animEffect transition="in" filter="fade">
                                       <p:cBhvr>
-                                        <p:cTn id="11" dur="500"/>
+                                        <p:cTn id="11" dur="250"/>
                                         <p:tgtEl>
                                           <p:spTgt spid="8">
                                             <p:txEl>
@@ -9054,7 +9054,7 @@
                         <p:par>
                           <p:cTn id="12" fill="hold">
                             <p:stCondLst>
-                              <p:cond delay="1000"/>
+                              <p:cond delay="750"/>
                             </p:stCondLst>
                             <p:childTnLst>
                               <p:par>
@@ -9087,7 +9087,7 @@
                                     </p:set>
                                     <p:animEffect transition="in" filter="fade">
                                       <p:cBhvr>
-                                        <p:cTn id="15" dur="500"/>
+                                        <p:cTn id="15" dur="250"/>
                                         <p:tgtEl>
                                           <p:spTgt spid="8">
                                             <p:txEl>
@@ -9106,7 +9106,7 @@
                         <p:par>
                           <p:cTn id="16" fill="hold">
                             <p:stCondLst>
-                              <p:cond delay="1500"/>
+                              <p:cond delay="1000"/>
                             </p:stCondLst>
                             <p:childTnLst>
                               <p:par>
@@ -9139,7 +9139,7 @@
                                     </p:set>
                                     <p:animEffect transition="in" filter="fade">
                                       <p:cBhvr>
-                                        <p:cTn id="19" dur="500"/>
+                                        <p:cTn id="19" dur="250"/>
                                         <p:tgtEl>
                                           <p:spTgt spid="8">
                                             <p:txEl>
@@ -9158,7 +9158,7 @@
                         <p:par>
                           <p:cTn id="20" fill="hold">
                             <p:stCondLst>
-                              <p:cond delay="2000"/>
+                              <p:cond delay="1250"/>
                             </p:stCondLst>
                             <p:childTnLst>
                               <p:par>
@@ -9191,7 +9191,7 @@
                                     </p:set>
                                     <p:animEffect transition="in" filter="fade">
                                       <p:cBhvr>
-                                        <p:cTn id="23" dur="500"/>
+                                        <p:cTn id="23" dur="250"/>
                                         <p:tgtEl>
                                           <p:spTgt spid="8">
                                             <p:txEl>

</xml_diff>